<commit_message>
use this final v
</commit_message>
<xml_diff>
--- a/Project Showcase.pptx
+++ b/Project Showcase.pptx
@@ -111,6 +111,11 @@
       </a:defRPr>
     </a:lvl9pPr>
   </p:defaultTextStyle>
+  <p:extLst>
+    <p:ext uri="{EFAFB233-063F-42B5-8137-9DF3F51BA10A}">
+      <p15:sldGuideLst xmlns:p15="http://schemas.microsoft.com/office/powerpoint/2012/main"/>
+    </p:ext>
+  </p:extLst>
 </p:presentation>
 </file>
 
@@ -3501,7 +3506,7 @@
           <a:p>
             <a:fld id="{FD46C50F-747F-4C39-9BBF-374B7CBBA4E7}" type="datetimeFigureOut">
               <a:rPr lang="en-CA" smtClean="0"/>
-              <a:t>2020-04-08</a:t>
+              <a:t>2020-04-09</a:t>
             </a:fld>
             <a:endParaRPr lang="en-CA"/>
           </a:p>
@@ -3701,7 +3706,7 @@
           <a:p>
             <a:fld id="{FD46C50F-747F-4C39-9BBF-374B7CBBA4E7}" type="datetimeFigureOut">
               <a:rPr lang="en-CA" smtClean="0"/>
-              <a:t>2020-04-08</a:t>
+              <a:t>2020-04-09</a:t>
             </a:fld>
             <a:endParaRPr lang="en-CA"/>
           </a:p>
@@ -3911,7 +3916,7 @@
           <a:p>
             <a:fld id="{FD46C50F-747F-4C39-9BBF-374B7CBBA4E7}" type="datetimeFigureOut">
               <a:rPr lang="en-CA" smtClean="0"/>
-              <a:t>2020-04-08</a:t>
+              <a:t>2020-04-09</a:t>
             </a:fld>
             <a:endParaRPr lang="en-CA"/>
           </a:p>
@@ -4111,7 +4116,7 @@
           <a:p>
             <a:fld id="{FD46C50F-747F-4C39-9BBF-374B7CBBA4E7}" type="datetimeFigureOut">
               <a:rPr lang="en-CA" smtClean="0"/>
-              <a:t>2020-04-08</a:t>
+              <a:t>2020-04-09</a:t>
             </a:fld>
             <a:endParaRPr lang="en-CA"/>
           </a:p>
@@ -4387,7 +4392,7 @@
           <a:p>
             <a:fld id="{FD46C50F-747F-4C39-9BBF-374B7CBBA4E7}" type="datetimeFigureOut">
               <a:rPr lang="en-CA" smtClean="0"/>
-              <a:t>2020-04-08</a:t>
+              <a:t>2020-04-09</a:t>
             </a:fld>
             <a:endParaRPr lang="en-CA"/>
           </a:p>
@@ -4655,7 +4660,7 @@
           <a:p>
             <a:fld id="{FD46C50F-747F-4C39-9BBF-374B7CBBA4E7}" type="datetimeFigureOut">
               <a:rPr lang="en-CA" smtClean="0"/>
-              <a:t>2020-04-08</a:t>
+              <a:t>2020-04-09</a:t>
             </a:fld>
             <a:endParaRPr lang="en-CA"/>
           </a:p>
@@ -5070,7 +5075,7 @@
           <a:p>
             <a:fld id="{FD46C50F-747F-4C39-9BBF-374B7CBBA4E7}" type="datetimeFigureOut">
               <a:rPr lang="en-CA" smtClean="0"/>
-              <a:t>2020-04-08</a:t>
+              <a:t>2020-04-09</a:t>
             </a:fld>
             <a:endParaRPr lang="en-CA"/>
           </a:p>
@@ -5212,7 +5217,7 @@
           <a:p>
             <a:fld id="{FD46C50F-747F-4C39-9BBF-374B7CBBA4E7}" type="datetimeFigureOut">
               <a:rPr lang="en-CA" smtClean="0"/>
-              <a:t>2020-04-08</a:t>
+              <a:t>2020-04-09</a:t>
             </a:fld>
             <a:endParaRPr lang="en-CA"/>
           </a:p>
@@ -5325,7 +5330,7 @@
           <a:p>
             <a:fld id="{FD46C50F-747F-4C39-9BBF-374B7CBBA4E7}" type="datetimeFigureOut">
               <a:rPr lang="en-CA" smtClean="0"/>
-              <a:t>2020-04-08</a:t>
+              <a:t>2020-04-09</a:t>
             </a:fld>
             <a:endParaRPr lang="en-CA"/>
           </a:p>
@@ -5638,7 +5643,7 @@
           <a:p>
             <a:fld id="{FD46C50F-747F-4C39-9BBF-374B7CBBA4E7}" type="datetimeFigureOut">
               <a:rPr lang="en-CA" smtClean="0"/>
-              <a:t>2020-04-08</a:t>
+              <a:t>2020-04-09</a:t>
             </a:fld>
             <a:endParaRPr lang="en-CA"/>
           </a:p>
@@ -5927,7 +5932,7 @@
           <a:p>
             <a:fld id="{FD46C50F-747F-4C39-9BBF-374B7CBBA4E7}" type="datetimeFigureOut">
               <a:rPr lang="en-CA" smtClean="0"/>
-              <a:t>2020-04-08</a:t>
+              <a:t>2020-04-09</a:t>
             </a:fld>
             <a:endParaRPr lang="en-CA"/>
           </a:p>
@@ -6170,7 +6175,7 @@
           <a:p>
             <a:fld id="{FD46C50F-747F-4C39-9BBF-374B7CBBA4E7}" type="datetimeFigureOut">
               <a:rPr lang="en-CA" smtClean="0"/>
-              <a:t>2020-04-08</a:t>
+              <a:t>2020-04-09</a:t>
             </a:fld>
             <a:endParaRPr lang="en-CA"/>
           </a:p>
@@ -7110,8 +7115,8 @@
           <a:lstStyle/>
           <a:p>
             <a:r>
-              <a:rPr lang="en-CA" sz="2800"/>
-              <a:t>Lakshmi &amp; Paddy</a:t>
+              <a:rPr lang="en-CA" sz="2800" dirty="0"/>
+              <a:t>Lakshmi &amp; Padmanabhan</a:t>
             </a:r>
           </a:p>
         </p:txBody>

</xml_diff>